<commit_message>
Better example for the Final Eval slide
Signed-off-by: JasonMendoza2008 <lhotteromain@gmail.com>
</commit_message>
<xml_diff>
--- a/Slides/Final Evaluation.pptx
+++ b/Slides/Final Evaluation.pptx
@@ -3557,10 +3557,10 @@
       </p:grpSpPr>
       <p:sp useBgFill="1">
         <p:nvSpPr>
-          <p:cNvPr id="10" name="Rectangle 9">
-            <a:extLst>
-              <a:ext uri="{FF2B5EF4-FFF2-40B4-BE49-F238E27FC236}">
-                <a16:creationId xmlns:a16="http://schemas.microsoft.com/office/drawing/2014/main" id="{743AA782-23D1-4521-8CAD-47662984AA08}"/>
+          <p:cNvPr id="17" name="Rectangle 16">
+            <a:extLst>
+              <a:ext uri="{FF2B5EF4-FFF2-40B4-BE49-F238E27FC236}">
+                <a16:creationId xmlns:a16="http://schemas.microsoft.com/office/drawing/2014/main" id="{2B97F24A-32CE-4C1C-A50D-3016B394DCFB}"/>
               </a:ext>
               <a:ext uri="{C183D7F6-B498-43B3-948B-1728B52AA6E4}">
                 <adec:decorative xmlns:adec="http://schemas.microsoft.com/office/drawing/2017/decorative" val="1"/>
@@ -3633,8 +3633,8 @@
         </p:nvSpPr>
         <p:spPr>
           <a:xfrm>
-            <a:off x="630936" y="640080"/>
-            <a:ext cx="4818888" cy="1481328"/>
+            <a:off x="630936" y="639520"/>
+            <a:ext cx="3429000" cy="1719072"/>
           </a:xfrm>
         </p:spPr>
         <p:txBody>
@@ -3652,10 +3652,10 @@
       </p:sp>
       <p:sp>
         <p:nvSpPr>
-          <p:cNvPr id="12" name="sketch line">
-            <a:extLst>
-              <a:ext uri="{FF2B5EF4-FFF2-40B4-BE49-F238E27FC236}">
-                <a16:creationId xmlns:a16="http://schemas.microsoft.com/office/drawing/2014/main" id="{650D18FE-0824-4A46-B22C-A86B52E5780A}"/>
+          <p:cNvPr id="19" name="sketch line">
+            <a:extLst>
+              <a:ext uri="{FF2B5EF4-FFF2-40B4-BE49-F238E27FC236}">
+                <a16:creationId xmlns:a16="http://schemas.microsoft.com/office/drawing/2014/main" id="{6357EC4F-235E-4222-A36F-C7878ACE37F2}"/>
               </a:ext>
               <a:ext uri="{C183D7F6-B498-43B3-948B-1728B52AA6E4}">
                 <adec:decorative xmlns:adec="http://schemas.microsoft.com/office/drawing/2017/decorative" val="1"/>
@@ -3675,7 +3675,7 @@
         </p:nvSpPr>
         <p:spPr>
           <a:xfrm>
-            <a:off x="643278" y="2372868"/>
+            <a:off x="643278" y="2573756"/>
             <a:ext cx="3255095" cy="18288"/>
           </a:xfrm>
           <a:custGeom>
@@ -3941,8 +3941,8 @@
         </p:nvSpPr>
         <p:spPr>
           <a:xfrm>
-            <a:off x="630936" y="2660904"/>
-            <a:ext cx="4818888" cy="3547872"/>
+            <a:off x="630936" y="2807208"/>
+            <a:ext cx="3429000" cy="3410712"/>
           </a:xfrm>
         </p:spPr>
         <p:txBody>
@@ -3951,16 +3951,14 @@
           </a:bodyPr>
           <a:lstStyle/>
           <a:p>
-            <a:pPr algn="just"/>
-            <a:r>
-              <a:rPr lang="en-GB" sz="2200" dirty="0"/>
+            <a:r>
+              <a:rPr lang="en-GB" sz="2000"/>
               <a:t>3D images in microscopy are sometimes not of great resolution for multiple reasons.</a:t>
             </a:r>
           </a:p>
           <a:p>
-            <a:pPr algn="just"/>
-            <a:r>
-              <a:rPr lang="en-GB" sz="2200" dirty="0"/>
+            <a:r>
+              <a:rPr lang="en-GB" sz="2000"/>
               <a:t>We give you pairs of real microscopy images (low-resolution &amp; high resolution). You must learn how to improve the resolution.</a:t>
             </a:r>
           </a:p>
@@ -3968,10 +3966,10 @@
       </p:sp>
       <p:pic>
         <p:nvPicPr>
-          <p:cNvPr id="5" name="Picture 4">
-            <a:extLst>
-              <a:ext uri="{FF2B5EF4-FFF2-40B4-BE49-F238E27FC236}">
-                <a16:creationId xmlns:a16="http://schemas.microsoft.com/office/drawing/2014/main" id="{F261EE32-751B-4F75-3396-55C25BBF7C0D}"/>
+          <p:cNvPr id="7" name="Picture 6">
+            <a:extLst>
+              <a:ext uri="{FF2B5EF4-FFF2-40B4-BE49-F238E27FC236}">
+                <a16:creationId xmlns:a16="http://schemas.microsoft.com/office/drawing/2014/main" id="{98E8CE76-9596-2DEA-B1EC-81CC368E17D1}"/>
               </a:ext>
             </a:extLst>
           </p:cNvPr>
@@ -3982,13 +3980,13 @@
         </p:nvPicPr>
         <p:blipFill>
           <a:blip r:embed="rId2"/>
-          <a:srcRect t="1712"/>
+          <a:srcRect l="1880" t="1497" r="24265"/>
           <a:stretch/>
         </p:blipFill>
         <p:spPr>
           <a:xfrm>
-            <a:off x="5566719" y="1288581"/>
-            <a:ext cx="6523626" cy="4344124"/>
+            <a:off x="4989264" y="948308"/>
+            <a:ext cx="6758719" cy="4800177"/>
           </a:xfrm>
           <a:prstGeom prst="rect">
             <a:avLst/>
@@ -4009,8 +4007,8 @@
         </p:nvSpPr>
         <p:spPr>
           <a:xfrm>
-            <a:off x="5961260" y="5632705"/>
-            <a:ext cx="5734543" cy="646331"/>
+            <a:off x="4808165" y="5841577"/>
+            <a:ext cx="7120916" cy="923330"/>
           </a:xfrm>
           <a:prstGeom prst="rect">
             <a:avLst/>
@@ -4023,9 +4021,14 @@
           </a:bodyPr>
           <a:lstStyle/>
           <a:p>
+            <a:pPr algn="ctr">
+              <a:spcAft>
+                <a:spcPts val="600"/>
+              </a:spcAft>
+            </a:pPr>
             <a:r>
               <a:rPr lang="en-GB" dirty="0"/>
-              <a:t>Figure1: Example of a data pair (only 3 slices are shown) of the training set (image_15_membrane_angle.tif)</a:t>
+              <a:t>Figure1: Example of a data pair (only 3 slices are shown, the resolution difference is very visible on slice 1) of the training set (image_15_membrane_angle.tif)</a:t>
             </a:r>
           </a:p>
         </p:txBody>

</xml_diff>

<commit_message>
Updated Final Evaluation slide
Signed-off-by: JasonMendoza2008 <lhotteromain@gmail.com>
</commit_message>
<xml_diff>
--- a/Slides/Final Evaluation.pptx
+++ b/Slides/Final Evaluation.pptx
@@ -8,6 +8,7 @@
     <p:sldId id="256" r:id="rId2"/>
     <p:sldId id="257" r:id="rId3"/>
     <p:sldId id="258" r:id="rId4"/>
+    <p:sldId id="259" r:id="rId5"/>
   </p:sldIdLst>
   <p:sldSz cx="12192000" cy="6858000"/>
   <p:notesSz cx="6858000" cy="9144000"/>
@@ -263,7 +264,7 @@
           <a:p>
             <a:fld id="{1C75981F-2EB5-410C-9B40-0C306D47576D}" type="datetimeFigureOut">
               <a:rPr lang="en-GB" smtClean="0"/>
-              <a:t>17/01/2025</a:t>
+              <a:t>21/01/2025</a:t>
             </a:fld>
             <a:endParaRPr lang="en-GB"/>
           </a:p>
@@ -463,7 +464,7 @@
           <a:p>
             <a:fld id="{1C75981F-2EB5-410C-9B40-0C306D47576D}" type="datetimeFigureOut">
               <a:rPr lang="en-GB" smtClean="0"/>
-              <a:t>17/01/2025</a:t>
+              <a:t>21/01/2025</a:t>
             </a:fld>
             <a:endParaRPr lang="en-GB"/>
           </a:p>
@@ -673,7 +674,7 @@
           <a:p>
             <a:fld id="{1C75981F-2EB5-410C-9B40-0C306D47576D}" type="datetimeFigureOut">
               <a:rPr lang="en-GB" smtClean="0"/>
-              <a:t>17/01/2025</a:t>
+              <a:t>21/01/2025</a:t>
             </a:fld>
             <a:endParaRPr lang="en-GB"/>
           </a:p>
@@ -873,7 +874,7 @@
           <a:p>
             <a:fld id="{1C75981F-2EB5-410C-9B40-0C306D47576D}" type="datetimeFigureOut">
               <a:rPr lang="en-GB" smtClean="0"/>
-              <a:t>17/01/2025</a:t>
+              <a:t>21/01/2025</a:t>
             </a:fld>
             <a:endParaRPr lang="en-GB"/>
           </a:p>
@@ -1149,7 +1150,7 @@
           <a:p>
             <a:fld id="{1C75981F-2EB5-410C-9B40-0C306D47576D}" type="datetimeFigureOut">
               <a:rPr lang="en-GB" smtClean="0"/>
-              <a:t>17/01/2025</a:t>
+              <a:t>21/01/2025</a:t>
             </a:fld>
             <a:endParaRPr lang="en-GB"/>
           </a:p>
@@ -1417,7 +1418,7 @@
           <a:p>
             <a:fld id="{1C75981F-2EB5-410C-9B40-0C306D47576D}" type="datetimeFigureOut">
               <a:rPr lang="en-GB" smtClean="0"/>
-              <a:t>17/01/2025</a:t>
+              <a:t>21/01/2025</a:t>
             </a:fld>
             <a:endParaRPr lang="en-GB"/>
           </a:p>
@@ -1832,7 +1833,7 @@
           <a:p>
             <a:fld id="{1C75981F-2EB5-410C-9B40-0C306D47576D}" type="datetimeFigureOut">
               <a:rPr lang="en-GB" smtClean="0"/>
-              <a:t>17/01/2025</a:t>
+              <a:t>21/01/2025</a:t>
             </a:fld>
             <a:endParaRPr lang="en-GB"/>
           </a:p>
@@ -1974,7 +1975,7 @@
           <a:p>
             <a:fld id="{1C75981F-2EB5-410C-9B40-0C306D47576D}" type="datetimeFigureOut">
               <a:rPr lang="en-GB" smtClean="0"/>
-              <a:t>17/01/2025</a:t>
+              <a:t>21/01/2025</a:t>
             </a:fld>
             <a:endParaRPr lang="en-GB"/>
           </a:p>
@@ -2087,7 +2088,7 @@
           <a:p>
             <a:fld id="{1C75981F-2EB5-410C-9B40-0C306D47576D}" type="datetimeFigureOut">
               <a:rPr lang="en-GB" smtClean="0"/>
-              <a:t>17/01/2025</a:t>
+              <a:t>21/01/2025</a:t>
             </a:fld>
             <a:endParaRPr lang="en-GB"/>
           </a:p>
@@ -2400,7 +2401,7 @@
           <a:p>
             <a:fld id="{1C75981F-2EB5-410C-9B40-0C306D47576D}" type="datetimeFigureOut">
               <a:rPr lang="en-GB" smtClean="0"/>
-              <a:t>17/01/2025</a:t>
+              <a:t>21/01/2025</a:t>
             </a:fld>
             <a:endParaRPr lang="en-GB"/>
           </a:p>
@@ -2689,7 +2690,7 @@
           <a:p>
             <a:fld id="{1C75981F-2EB5-410C-9B40-0C306D47576D}" type="datetimeFigureOut">
               <a:rPr lang="en-GB" smtClean="0"/>
-              <a:t>17/01/2025</a:t>
+              <a:t>21/01/2025</a:t>
             </a:fld>
             <a:endParaRPr lang="en-GB"/>
           </a:p>
@@ -2932,7 +2933,7 @@
           <a:p>
             <a:fld id="{1C75981F-2EB5-410C-9B40-0C306D47576D}" type="datetimeFigureOut">
               <a:rPr lang="en-GB" smtClean="0"/>
-              <a:t>17/01/2025</a:t>
+              <a:t>21/01/2025</a:t>
             </a:fld>
             <a:endParaRPr lang="en-GB"/>
           </a:p>
@@ -3512,7 +3513,29 @@
             </a:r>
             <a:r>
               <a:rPr lang="en-GB" dirty="0"/>
-              <a:t> of March</a:t>
+              <a:t> of March.</a:t>
+            </a:r>
+          </a:p>
+          <a:p>
+            <a:pPr algn="just"/>
+            <a:endParaRPr lang="en-GB" dirty="0"/>
+          </a:p>
+          <a:p>
+            <a:pPr algn="just"/>
+            <a:r>
+              <a:rPr lang="en-GB" dirty="0"/>
+              <a:t>This project is 50% of your overall grade.</a:t>
+            </a:r>
+          </a:p>
+          <a:p>
+            <a:pPr algn="just"/>
+            <a:endParaRPr lang="en-GB" dirty="0"/>
+          </a:p>
+          <a:p>
+            <a:pPr algn="just"/>
+            <a:r>
+              <a:rPr lang="en-GB" dirty="0"/>
+              <a:t>Teams of 4 max.</a:t>
             </a:r>
           </a:p>
         </p:txBody>
@@ -4037,6 +4060,166 @@
     <p:extLst>
       <p:ext uri="{BB962C8B-B14F-4D97-AF65-F5344CB8AC3E}">
         <p14:creationId xmlns:p14="http://schemas.microsoft.com/office/powerpoint/2010/main" val="3573909722"/>
+      </p:ext>
+    </p:extLst>
+  </p:cSld>
+  <p:clrMapOvr>
+    <a:masterClrMapping/>
+  </p:clrMapOvr>
+</p:sld>
+</file>
+
+<file path=ppt/slides/slide4.xml><?xml version="1.0" encoding="utf-8"?>
+<p:sld xmlns:a="http://schemas.openxmlformats.org/drawingml/2006/main" xmlns:r="http://schemas.openxmlformats.org/officeDocument/2006/relationships" xmlns:p="http://schemas.openxmlformats.org/presentationml/2006/main">
+  <p:cSld>
+    <p:spTree>
+      <p:nvGrpSpPr>
+        <p:cNvPr id="1" name=""/>
+        <p:cNvGrpSpPr/>
+        <p:nvPr/>
+      </p:nvGrpSpPr>
+      <p:grpSpPr>
+        <a:xfrm>
+          <a:off x="0" y="0"/>
+          <a:ext cx="0" cy="0"/>
+          <a:chOff x="0" y="0"/>
+          <a:chExt cx="0" cy="0"/>
+        </a:xfrm>
+      </p:grpSpPr>
+      <p:sp>
+        <p:nvSpPr>
+          <p:cNvPr id="2" name="Title 1">
+            <a:extLst>
+              <a:ext uri="{FF2B5EF4-FFF2-40B4-BE49-F238E27FC236}">
+                <a16:creationId xmlns:a16="http://schemas.microsoft.com/office/drawing/2014/main" id="{093AF7FD-5931-3D24-80A3-0E877BD84EDB}"/>
+              </a:ext>
+            </a:extLst>
+          </p:cNvPr>
+          <p:cNvSpPr>
+            <a:spLocks noGrp="1"/>
+          </p:cNvSpPr>
+          <p:nvPr>
+            <p:ph type="title"/>
+          </p:nvPr>
+        </p:nvSpPr>
+        <p:spPr/>
+        <p:txBody>
+          <a:bodyPr/>
+          <a:lstStyle/>
+          <a:p>
+            <a:r>
+              <a:rPr lang="fr-FR" dirty="0"/>
+              <a:t>Data</a:t>
+            </a:r>
+          </a:p>
+        </p:txBody>
+      </p:sp>
+      <p:sp>
+        <p:nvSpPr>
+          <p:cNvPr id="3" name="Content Placeholder 2">
+            <a:extLst>
+              <a:ext uri="{FF2B5EF4-FFF2-40B4-BE49-F238E27FC236}">
+                <a16:creationId xmlns:a16="http://schemas.microsoft.com/office/drawing/2014/main" id="{05F7803F-A1A3-3375-A5E1-97704DA03ACF}"/>
+              </a:ext>
+            </a:extLst>
+          </p:cNvPr>
+          <p:cNvSpPr>
+            <a:spLocks noGrp="1"/>
+          </p:cNvSpPr>
+          <p:nvPr>
+            <p:ph idx="1"/>
+          </p:nvPr>
+        </p:nvSpPr>
+        <p:spPr>
+          <a:xfrm>
+            <a:off x="838200" y="1508078"/>
+            <a:ext cx="10515600" cy="4984797"/>
+          </a:xfrm>
+        </p:spPr>
+        <p:txBody>
+          <a:bodyPr>
+            <a:normAutofit lnSpcReduction="10000"/>
+          </a:bodyPr>
+          <a:lstStyle/>
+          <a:p>
+            <a:pPr algn="just"/>
+            <a:r>
+              <a:rPr lang="en-US" dirty="0"/>
+              <a:t>All images are 3D, represented with 3D array shapes (.</a:t>
+            </a:r>
+            <a:r>
+              <a:rPr lang="en-US" dirty="0" err="1"/>
+              <a:t>tif</a:t>
+            </a:r>
+            <a:r>
+              <a:rPr lang="en-US" dirty="0"/>
+              <a:t> format) in the ZYX format. </a:t>
+            </a:r>
+          </a:p>
+          <a:p>
+            <a:pPr algn="just"/>
+            <a:r>
+              <a:rPr lang="en-US" dirty="0"/>
+              <a:t>You can find them on the DCE at </a:t>
+            </a:r>
+            <a:r>
+              <a:rPr lang="en-US" sz="2400" dirty="0">
+                <a:latin typeface="Cascadia Code" panose="020B0609020000020004" pitchFamily="49" charset="0"/>
+                <a:cs typeface="Cascadia Code" panose="020B0609020000020004" pitchFamily="49" charset="0"/>
+              </a:rPr>
+              <a:t>/mounts/Datasets4/DeepLearningVSE2025</a:t>
+            </a:r>
+            <a:r>
+              <a:rPr lang="en-US" dirty="0"/>
+              <a:t>.</a:t>
+            </a:r>
+          </a:p>
+          <a:p>
+            <a:pPr algn="just"/>
+            <a:r>
+              <a:rPr lang="en-US" dirty="0"/>
+              <a:t>Run </a:t>
+            </a:r>
+            <a:r>
+              <a:rPr lang="en-US" sz="2400" dirty="0">
+                <a:latin typeface="Cascadia Code" panose="020B0609020000020004" pitchFamily="49" charset="0"/>
+                <a:cs typeface="Cascadia Code" panose="020B0609020000020004" pitchFamily="49" charset="0"/>
+              </a:rPr>
+              <a:t>cd /mounts/Datasets4/DeepLearningVSE2025</a:t>
+            </a:r>
+            <a:r>
+              <a:rPr lang="en-US" dirty="0"/>
+              <a:t> to make sure everything is ok.</a:t>
+            </a:r>
+          </a:p>
+          <a:p>
+            <a:pPr algn="just"/>
+            <a:r>
+              <a:rPr lang="en-US" dirty="0"/>
+              <a:t>In this image-to-image task, you will work with </a:t>
+            </a:r>
+            <a:r>
+              <a:rPr lang="en-US" b="1" dirty="0"/>
+              <a:t>pairs</a:t>
+            </a:r>
+            <a:r>
+              <a:rPr lang="en-US" dirty="0"/>
+              <a:t> of images for the training task. The input images, referred to as "angles," correspond to the initial view, while the "fused" images serve as the ground truth. </a:t>
+            </a:r>
+          </a:p>
+          <a:p>
+            <a:pPr algn="just"/>
+            <a:r>
+              <a:rPr lang="en-US" dirty="0"/>
+              <a:t>In the test set you will only have the “angles” images (for now there is no test set accessible to you).</a:t>
+            </a:r>
+          </a:p>
+        </p:txBody>
+      </p:sp>
+    </p:spTree>
+    <p:extLst>
+      <p:ext uri="{BB962C8B-B14F-4D97-AF65-F5344CB8AC3E}">
+        <p14:creationId xmlns:p14="http://schemas.microsoft.com/office/powerpoint/2010/main" val="1469360832"/>
       </p:ext>
     </p:extLst>
   </p:cSld>

</xml_diff>